<commit_message>
PowerPoint presentation (completed v2)
</commit_message>
<xml_diff>
--- a/SecureGO.pptx
+++ b/SecureGO.pptx
@@ -274,7 +274,7 @@
           <a:p>
             <a:fld id="{91691E37-C42D-4C7E-9228-EE515BAF3927}" type="datetimeFigureOut">
               <a:rPr lang="en-US" smtClean="0"/>
-              <a:t>4/26/2025</a:t>
+              <a:t>4/27/2025</a:t>
             </a:fld>
             <a:endParaRPr lang="en-US"/>
           </a:p>
@@ -472,7 +472,7 @@
           <a:p>
             <a:fld id="{91691E37-C42D-4C7E-9228-EE515BAF3927}" type="datetimeFigureOut">
               <a:rPr lang="en-US" smtClean="0"/>
-              <a:t>4/26/2025</a:t>
+              <a:t>4/27/2025</a:t>
             </a:fld>
             <a:endParaRPr lang="en-US"/>
           </a:p>
@@ -680,7 +680,7 @@
           <a:p>
             <a:fld id="{91691E37-C42D-4C7E-9228-EE515BAF3927}" type="datetimeFigureOut">
               <a:rPr lang="en-US" smtClean="0"/>
-              <a:t>4/26/2025</a:t>
+              <a:t>4/27/2025</a:t>
             </a:fld>
             <a:endParaRPr lang="en-US"/>
           </a:p>
@@ -878,7 +878,7 @@
           <a:p>
             <a:fld id="{91691E37-C42D-4C7E-9228-EE515BAF3927}" type="datetimeFigureOut">
               <a:rPr lang="en-US" smtClean="0"/>
-              <a:t>4/26/2025</a:t>
+              <a:t>4/27/2025</a:t>
             </a:fld>
             <a:endParaRPr lang="en-US"/>
           </a:p>
@@ -1153,7 +1153,7 @@
           <a:p>
             <a:fld id="{91691E37-C42D-4C7E-9228-EE515BAF3927}" type="datetimeFigureOut">
               <a:rPr lang="en-US" smtClean="0"/>
-              <a:t>4/26/2025</a:t>
+              <a:t>4/27/2025</a:t>
             </a:fld>
             <a:endParaRPr lang="en-US"/>
           </a:p>
@@ -1418,7 +1418,7 @@
           <a:p>
             <a:fld id="{91691E37-C42D-4C7E-9228-EE515BAF3927}" type="datetimeFigureOut">
               <a:rPr lang="en-US" smtClean="0"/>
-              <a:t>4/26/2025</a:t>
+              <a:t>4/27/2025</a:t>
             </a:fld>
             <a:endParaRPr lang="en-US"/>
           </a:p>
@@ -1830,7 +1830,7 @@
           <a:p>
             <a:fld id="{91691E37-C42D-4C7E-9228-EE515BAF3927}" type="datetimeFigureOut">
               <a:rPr lang="en-US" smtClean="0"/>
-              <a:t>4/26/2025</a:t>
+              <a:t>4/27/2025</a:t>
             </a:fld>
             <a:endParaRPr lang="en-US"/>
           </a:p>
@@ -1971,7 +1971,7 @@
           <a:p>
             <a:fld id="{91691E37-C42D-4C7E-9228-EE515BAF3927}" type="datetimeFigureOut">
               <a:rPr lang="en-US" smtClean="0"/>
-              <a:t>4/26/2025</a:t>
+              <a:t>4/27/2025</a:t>
             </a:fld>
             <a:endParaRPr lang="en-US"/>
           </a:p>
@@ -2084,7 +2084,7 @@
           <a:p>
             <a:fld id="{91691E37-C42D-4C7E-9228-EE515BAF3927}" type="datetimeFigureOut">
               <a:rPr lang="en-US" smtClean="0"/>
-              <a:t>4/26/2025</a:t>
+              <a:t>4/27/2025</a:t>
             </a:fld>
             <a:endParaRPr lang="en-US"/>
           </a:p>
@@ -2395,7 +2395,7 @@
           <a:p>
             <a:fld id="{91691E37-C42D-4C7E-9228-EE515BAF3927}" type="datetimeFigureOut">
               <a:rPr lang="en-US" smtClean="0"/>
-              <a:t>4/26/2025</a:t>
+              <a:t>4/27/2025</a:t>
             </a:fld>
             <a:endParaRPr lang="en-US"/>
           </a:p>
@@ -2683,7 +2683,7 @@
           <a:p>
             <a:fld id="{91691E37-C42D-4C7E-9228-EE515BAF3927}" type="datetimeFigureOut">
               <a:rPr lang="en-US" smtClean="0"/>
-              <a:t>4/26/2025</a:t>
+              <a:t>4/27/2025</a:t>
             </a:fld>
             <a:endParaRPr lang="en-US"/>
           </a:p>
@@ -2924,7 +2924,7 @@
           <a:p>
             <a:fld id="{91691E37-C42D-4C7E-9228-EE515BAF3927}" type="datetimeFigureOut">
               <a:rPr lang="en-US" smtClean="0"/>
-              <a:t>4/26/2025</a:t>
+              <a:t>4/27/2025</a:t>
             </a:fld>
             <a:endParaRPr lang="en-US"/>
           </a:p>
@@ -7071,12 +7071,36 @@
               <a:buChar char="•"/>
             </a:pPr>
             <a:r>
+              <a:rPr lang="fr-FR" sz="2800" dirty="0" err="1">
+                <a:solidFill>
+                  <a:schemeClr val="bg1"/>
+                </a:solidFill>
+              </a:rPr>
+              <a:t>Expanding</a:t>
+            </a:r>
+            <a:r>
               <a:rPr lang="fr-FR" sz="2800" dirty="0">
                 <a:solidFill>
                   <a:schemeClr val="bg1"/>
                 </a:solidFill>
               </a:rPr>
-              <a:t>Mobile browser support (Android/iOS)</a:t>
+              <a:t> to </a:t>
+            </a:r>
+            <a:r>
+              <a:rPr lang="fr-FR" sz="2800" dirty="0" err="1">
+                <a:solidFill>
+                  <a:schemeClr val="bg1"/>
+                </a:solidFill>
+              </a:rPr>
+              <a:t>other</a:t>
+            </a:r>
+            <a:r>
+              <a:rPr lang="fr-FR" sz="2800" dirty="0">
+                <a:solidFill>
+                  <a:schemeClr val="bg1"/>
+                </a:solidFill>
+              </a:rPr>
+              <a:t> browsers</a:t>
             </a:r>
           </a:p>
           <a:p>
@@ -7179,53 +7203,6 @@
       </p:sp>
       <p:pic>
         <p:nvPicPr>
-          <p:cNvPr id="6146" name="Picture 2" descr="Android vs iOS App UI Design: Key Differences Explored">
-            <a:extLst>
-              <a:ext uri="{FF2B5EF4-FFF2-40B4-BE49-F238E27FC236}">
-                <a16:creationId xmlns:a16="http://schemas.microsoft.com/office/drawing/2014/main" id="{18BEB452-CE22-2153-C174-23AB0B406DA5}"/>
-              </a:ext>
-            </a:extLst>
-          </p:cNvPr>
-          <p:cNvPicPr>
-            <a:picLocks noChangeAspect="1" noChangeArrowheads="1"/>
-          </p:cNvPicPr>
-          <p:nvPr/>
-        </p:nvPicPr>
-        <p:blipFill>
-          <a:blip r:embed="rId3">
-            <a:extLst>
-              <a:ext uri="{28A0092B-C50C-407E-A947-70E740481C1C}">
-                <a14:useLocalDpi xmlns:a14="http://schemas.microsoft.com/office/drawing/2010/main" val="0"/>
-              </a:ext>
-            </a:extLst>
-          </a:blip>
-          <a:srcRect/>
-          <a:stretch>
-            <a:fillRect/>
-          </a:stretch>
-        </p:blipFill>
-        <p:spPr bwMode="auto">
-          <a:xfrm>
-            <a:off x="7089638" y="1318028"/>
-            <a:ext cx="3792704" cy="2229181"/>
-          </a:xfrm>
-          <a:prstGeom prst="rect">
-            <a:avLst/>
-          </a:prstGeom>
-          <a:noFill/>
-          <a:extLst>
-            <a:ext uri="{909E8E84-426E-40DD-AFC4-6F175D3DCCD1}">
-              <a14:hiddenFill xmlns:a14="http://schemas.microsoft.com/office/drawing/2010/main">
-                <a:solidFill>
-                  <a:srgbClr val="FFFFFF"/>
-                </a:solidFill>
-              </a14:hiddenFill>
-            </a:ext>
-          </a:extLst>
-        </p:spPr>
-      </p:pic>
-      <p:pic>
-        <p:nvPicPr>
           <p:cNvPr id="6150" name="Picture 6" descr="16 things to do with a VPN in 2025 - Surfshark">
             <a:extLst>
               <a:ext uri="{FF2B5EF4-FFF2-40B4-BE49-F238E27FC236}">
@@ -7239,7 +7216,7 @@
           <p:nvPr/>
         </p:nvPicPr>
         <p:blipFill rotWithShape="1">
-          <a:blip r:embed="rId4">
+          <a:blip r:embed="rId3">
             <a:extLst>
               <a:ext uri="{28A0092B-C50C-407E-A947-70E740481C1C}">
                 <a14:useLocalDpi xmlns:a14="http://schemas.microsoft.com/office/drawing/2010/main" val="0"/>
@@ -7251,7 +7228,7 @@
         </p:blipFill>
         <p:spPr bwMode="auto">
           <a:xfrm>
-            <a:off x="9419374" y="3803542"/>
+            <a:off x="9420898" y="3934544"/>
             <a:ext cx="2456612" cy="2545959"/>
           </a:xfrm>
           <a:prstGeom prst="rect">
@@ -7284,7 +7261,7 @@
           <p:nvPr/>
         </p:nvPicPr>
         <p:blipFill>
-          <a:blip r:embed="rId5">
+          <a:blip r:embed="rId4">
             <a:extLst>
               <a:ext uri="{28A0092B-C50C-407E-A947-70E740481C1C}">
                 <a14:useLocalDpi xmlns:a14="http://schemas.microsoft.com/office/drawing/2010/main" val="0"/>
@@ -7300,6 +7277,53 @@
           <a:xfrm>
             <a:off x="997805" y="4127828"/>
             <a:ext cx="7267575" cy="2352675"/>
+          </a:xfrm>
+          <a:prstGeom prst="rect">
+            <a:avLst/>
+          </a:prstGeom>
+          <a:noFill/>
+          <a:extLst>
+            <a:ext uri="{909E8E84-426E-40DD-AFC4-6F175D3DCCD1}">
+              <a14:hiddenFill xmlns:a14="http://schemas.microsoft.com/office/drawing/2010/main">
+                <a:solidFill>
+                  <a:srgbClr val="FFFFFF"/>
+                </a:solidFill>
+              </a14:hiddenFill>
+            </a:ext>
+          </a:extLst>
+        </p:spPr>
+      </p:pic>
+      <p:pic>
+        <p:nvPicPr>
+          <p:cNvPr id="1026" name="Picture 2" descr="The 7 best web browsers in 2025 | Zapier">
+            <a:extLst>
+              <a:ext uri="{FF2B5EF4-FFF2-40B4-BE49-F238E27FC236}">
+                <a16:creationId xmlns:a16="http://schemas.microsoft.com/office/drawing/2014/main" id="{8122298E-C9A5-48A6-C734-A8C37571F99C}"/>
+              </a:ext>
+            </a:extLst>
+          </p:cNvPr>
+          <p:cNvPicPr>
+            <a:picLocks noChangeAspect="1" noChangeArrowheads="1"/>
+          </p:cNvPicPr>
+          <p:nvPr/>
+        </p:nvPicPr>
+        <p:blipFill>
+          <a:blip r:embed="rId5">
+            <a:extLst>
+              <a:ext uri="{28A0092B-C50C-407E-A947-70E740481C1C}">
+                <a14:useLocalDpi xmlns:a14="http://schemas.microsoft.com/office/drawing/2010/main" val="0"/>
+              </a:ext>
+            </a:extLst>
+          </a:blip>
+          <a:srcRect/>
+          <a:stretch>
+            <a:fillRect/>
+          </a:stretch>
+        </p:blipFill>
+        <p:spPr bwMode="auto">
+          <a:xfrm>
+            <a:off x="6062054" y="1202041"/>
+            <a:ext cx="5083342" cy="2548290"/>
           </a:xfrm>
           <a:prstGeom prst="rect">
             <a:avLst/>
@@ -7391,7 +7415,7 @@
                                           </p:stCondLst>
                                         </p:cTn>
                                         <p:tgtEl>
-                                          <p:spTgt spid="6146"/>
+                                          <p:spTgt spid="1026"/>
                                         </p:tgtEl>
                                         <p:attrNameLst>
                                           <p:attrName>style.visibility</p:attrName>

</xml_diff>